<commit_message>
update ml part - chad
</commit_message>
<xml_diff>
--- a/ppt/ML-Ames.pptx
+++ b/ppt/ML-Ames.pptx
@@ -5,22 +5,23 @@
     <p:sldMasterId id="2147483648" r:id="rId1"/>
   </p:sldMasterIdLst>
   <p:notesMasterIdLst>
-    <p:notesMasterId r:id="rId15"/>
+    <p:notesMasterId r:id="rId16"/>
   </p:notesMasterIdLst>
   <p:sldIdLst>
     <p:sldId id="267" r:id="rId2"/>
     <p:sldId id="263" r:id="rId3"/>
     <p:sldId id="271" r:id="rId4"/>
-    <p:sldId id="268" r:id="rId5"/>
-    <p:sldId id="272" r:id="rId6"/>
-    <p:sldId id="275" r:id="rId7"/>
-    <p:sldId id="279" r:id="rId8"/>
-    <p:sldId id="269" r:id="rId9"/>
-    <p:sldId id="276" r:id="rId10"/>
-    <p:sldId id="277" r:id="rId11"/>
-    <p:sldId id="278" r:id="rId12"/>
-    <p:sldId id="270" r:id="rId13"/>
-    <p:sldId id="280" r:id="rId14"/>
+    <p:sldId id="281" r:id="rId5"/>
+    <p:sldId id="268" r:id="rId6"/>
+    <p:sldId id="272" r:id="rId7"/>
+    <p:sldId id="275" r:id="rId8"/>
+    <p:sldId id="279" r:id="rId9"/>
+    <p:sldId id="269" r:id="rId10"/>
+    <p:sldId id="276" r:id="rId11"/>
+    <p:sldId id="277" r:id="rId12"/>
+    <p:sldId id="278" r:id="rId13"/>
+    <p:sldId id="270" r:id="rId14"/>
+    <p:sldId id="280" r:id="rId15"/>
   </p:sldIdLst>
   <p:sldSz cx="12192000" cy="6858000"/>
   <p:notesSz cx="6858000" cy="9144000"/>
@@ -209,7 +210,7 @@
           <a:p>
             <a:fld id="{8C044CB9-82DB-4478-8371-945BCF855AFD}" type="datetimeFigureOut">
               <a:rPr lang="en-US" smtClean="0"/>
-              <a:t>5/17/2022</a:t>
+              <a:t>5/20/2022</a:t>
             </a:fld>
             <a:endParaRPr lang="en-US"/>
           </a:p>
@@ -707,7 +708,7 @@
           <a:p>
             <a:fld id="{41981E10-B996-4316-8C06-54124B9D1A1D}" type="datetime1">
               <a:rPr lang="en-US" smtClean="0"/>
-              <a:t>5/17/2022</a:t>
+              <a:t>5/20/2022</a:t>
             </a:fld>
             <a:endParaRPr lang="en-US"/>
           </a:p>
@@ -905,7 +906,7 @@
           <a:p>
             <a:fld id="{B6C11BE7-99F8-41B3-A951-32115285F9A2}" type="datetime1">
               <a:rPr lang="en-US" smtClean="0"/>
-              <a:t>5/17/2022</a:t>
+              <a:t>5/20/2022</a:t>
             </a:fld>
             <a:endParaRPr lang="en-US"/>
           </a:p>
@@ -1113,7 +1114,7 @@
           <a:p>
             <a:fld id="{5AD5714F-9C75-4A8A-B05C-412CE04B321A}" type="datetime1">
               <a:rPr lang="en-US" smtClean="0"/>
-              <a:t>5/17/2022</a:t>
+              <a:t>5/20/2022</a:t>
             </a:fld>
             <a:endParaRPr lang="en-US"/>
           </a:p>
@@ -1386,7 +1387,7 @@
           <a:p>
             <a:fld id="{65D44833-009D-4749-A011-6A87CA40116A}" type="datetime1">
               <a:rPr lang="en-US" smtClean="0"/>
-              <a:t>5/17/2022</a:t>
+              <a:t>5/20/2022</a:t>
             </a:fld>
             <a:endParaRPr lang="en-US" dirty="0"/>
           </a:p>
@@ -1657,7 +1658,7 @@
           <a:p>
             <a:fld id="{526AB632-71AF-4366-A185-53EBEC722B02}" type="datetime1">
               <a:rPr lang="en-US" smtClean="0"/>
-              <a:t>5/17/2022</a:t>
+              <a:t>5/20/2022</a:t>
             </a:fld>
             <a:endParaRPr lang="en-US"/>
           </a:p>
@@ -1932,7 +1933,7 @@
           <a:p>
             <a:fld id="{E589F0E4-AF30-44A3-B382-8BD30A165FBF}" type="datetime1">
               <a:rPr lang="en-US" smtClean="0"/>
-              <a:t>5/17/2022</a:t>
+              <a:t>5/20/2022</a:t>
             </a:fld>
             <a:endParaRPr lang="en-US"/>
           </a:p>
@@ -2197,7 +2198,7 @@
           <a:p>
             <a:fld id="{C4DF8233-AC10-4FEA-9950-6BA653410B63}" type="datetime1">
               <a:rPr lang="en-US" smtClean="0"/>
-              <a:t>5/17/2022</a:t>
+              <a:t>5/20/2022</a:t>
             </a:fld>
             <a:endParaRPr lang="en-US"/>
           </a:p>
@@ -2609,7 +2610,7 @@
           <a:p>
             <a:fld id="{24BD646F-768F-4762-AD83-1A1C61FD5D62}" type="datetime1">
               <a:rPr lang="en-US" smtClean="0"/>
-              <a:t>5/17/2022</a:t>
+              <a:t>5/20/2022</a:t>
             </a:fld>
             <a:endParaRPr lang="en-US"/>
           </a:p>
@@ -2750,7 +2751,7 @@
           <a:p>
             <a:fld id="{CCCB839E-5623-4201-8E26-A2E259CD22CE}" type="datetime1">
               <a:rPr lang="en-US" smtClean="0"/>
-              <a:t>5/17/2022</a:t>
+              <a:t>5/20/2022</a:t>
             </a:fld>
             <a:endParaRPr lang="en-US"/>
           </a:p>
@@ -2863,7 +2864,7 @@
           <a:p>
             <a:fld id="{44708155-832F-466F-A4A5-48C3C8CC9B70}" type="datetime1">
               <a:rPr lang="en-US" smtClean="0"/>
-              <a:t>5/17/2022</a:t>
+              <a:t>5/20/2022</a:t>
             </a:fld>
             <a:endParaRPr lang="en-US"/>
           </a:p>
@@ -3174,7 +3175,7 @@
           <a:p>
             <a:fld id="{CAD50151-A1A9-48B1-B7FF-B70CACAFACFF}" type="datetime1">
               <a:rPr lang="en-US" smtClean="0"/>
-              <a:t>5/17/2022</a:t>
+              <a:t>5/20/2022</a:t>
             </a:fld>
             <a:endParaRPr lang="en-US"/>
           </a:p>
@@ -3462,7 +3463,7 @@
           <a:p>
             <a:fld id="{43AC419B-A920-47E8-9DE9-02E2C80B6C21}" type="datetime1">
               <a:rPr lang="en-US" smtClean="0"/>
-              <a:t>5/17/2022</a:t>
+              <a:t>5/20/2022</a:t>
             </a:fld>
             <a:endParaRPr lang="en-US"/>
           </a:p>
@@ -3703,7 +3704,7 @@
           <a:p>
             <a:fld id="{B03A1A1C-F4C0-4CE5-9135-992491B60315}" type="datetime1">
               <a:rPr lang="en-US" smtClean="0"/>
-              <a:t>5/17/2022</a:t>
+              <a:t>5/20/2022</a:t>
             </a:fld>
             <a:endParaRPr lang="en-US"/>
           </a:p>
@@ -4271,7 +4272,7 @@
           <a:p>
             <a:r>
               <a:rPr lang="en-US" dirty="0"/>
-              <a:t>ML Model Development </a:t>
+              <a:t>Feature Engineering</a:t>
             </a:r>
           </a:p>
         </p:txBody>
@@ -4297,7 +4298,16 @@
           <a:bodyPr/>
           <a:lstStyle/>
           <a:p>
-            <a:endParaRPr lang="en-US"/>
+            <a:r>
+              <a:rPr lang="en-US" dirty="0"/>
+              <a:t>James: New feature</a:t>
+            </a:r>
+          </a:p>
+          <a:p>
+            <a:r>
+              <a:rPr lang="en-US" dirty="0"/>
+              <a:t>Chad: Neighborhood</a:t>
+            </a:r>
           </a:p>
         </p:txBody>
       </p:sp>
@@ -4338,7 +4348,7 @@
           <p:cNvPr id="5" name="Slide Number Placeholder 4">
             <a:extLst>
               <a:ext uri="{FF2B5EF4-FFF2-40B4-BE49-F238E27FC236}">
-                <a16:creationId xmlns:a16="http://schemas.microsoft.com/office/drawing/2014/main" id="{8CF178EC-77B3-B3C7-AF05-E241B564C135}"/>
+                <a16:creationId xmlns:a16="http://schemas.microsoft.com/office/drawing/2014/main" id="{9D4EB37D-7E69-70B4-9322-EE89C43D6997}"/>
               </a:ext>
             </a:extLst>
           </p:cNvPr>
@@ -4366,7 +4376,7 @@
     </p:spTree>
     <p:extLst>
       <p:ext uri="{BB962C8B-B14F-4D97-AF65-F5344CB8AC3E}">
-        <p14:creationId xmlns:p14="http://schemas.microsoft.com/office/powerpoint/2010/main" val="322292711"/>
+        <p14:creationId xmlns:p14="http://schemas.microsoft.com/office/powerpoint/2010/main" val="3294741974"/>
       </p:ext>
     </p:extLst>
   </p:cSld>
@@ -4416,7 +4426,7 @@
           <a:p>
             <a:r>
               <a:rPr lang="en-US" dirty="0"/>
-              <a:t>ML Model Testing</a:t>
+              <a:t>ML Model Development </a:t>
             </a:r>
           </a:p>
         </p:txBody>
@@ -4483,7 +4493,7 @@
           <p:cNvPr id="5" name="Slide Number Placeholder 4">
             <a:extLst>
               <a:ext uri="{FF2B5EF4-FFF2-40B4-BE49-F238E27FC236}">
-                <a16:creationId xmlns:a16="http://schemas.microsoft.com/office/drawing/2014/main" id="{5094DE80-C79D-2479-C215-181BF7229889}"/>
+                <a16:creationId xmlns:a16="http://schemas.microsoft.com/office/drawing/2014/main" id="{8CF178EC-77B3-B3C7-AF05-E241B564C135}"/>
               </a:ext>
             </a:extLst>
           </p:cNvPr>
@@ -4511,7 +4521,7 @@
     </p:spTree>
     <p:extLst>
       <p:ext uri="{BB962C8B-B14F-4D97-AF65-F5344CB8AC3E}">
-        <p14:creationId xmlns:p14="http://schemas.microsoft.com/office/powerpoint/2010/main" val="1955825873"/>
+        <p14:creationId xmlns:p14="http://schemas.microsoft.com/office/powerpoint/2010/main" val="322292711"/>
       </p:ext>
     </p:extLst>
   </p:cSld>
@@ -4543,7 +4553,7 @@
           <p:cNvPr id="2" name="Title 1">
             <a:extLst>
               <a:ext uri="{FF2B5EF4-FFF2-40B4-BE49-F238E27FC236}">
-                <a16:creationId xmlns:a16="http://schemas.microsoft.com/office/drawing/2014/main" id="{45E6E326-373C-1AC4-C097-04883C94499F}"/>
+                <a16:creationId xmlns:a16="http://schemas.microsoft.com/office/drawing/2014/main" id="{01D402C1-836E-3879-130F-2A6BE329EFED}"/>
               </a:ext>
             </a:extLst>
           </p:cNvPr>
@@ -4561,7 +4571,7 @@
           <a:p>
             <a:r>
               <a:rPr lang="en-US" dirty="0"/>
-              <a:t>Shiny App Development</a:t>
+              <a:t>ML Model Testing</a:t>
             </a:r>
           </a:p>
         </p:txBody>
@@ -4571,7 +4581,7 @@
           <p:cNvPr id="3" name="Content Placeholder 2">
             <a:extLst>
               <a:ext uri="{FF2B5EF4-FFF2-40B4-BE49-F238E27FC236}">
-                <a16:creationId xmlns:a16="http://schemas.microsoft.com/office/drawing/2014/main" id="{D90E4584-4AB6-7739-CF56-FED9201B5E53}"/>
+                <a16:creationId xmlns:a16="http://schemas.microsoft.com/office/drawing/2014/main" id="{F95B9AB7-EFF2-99F4-711E-7097D86B30CF}"/>
               </a:ext>
             </a:extLst>
           </p:cNvPr>
@@ -4596,7 +4606,7 @@
           <p:cNvPr id="4" name="Text Placeholder 3">
             <a:extLst>
               <a:ext uri="{FF2B5EF4-FFF2-40B4-BE49-F238E27FC236}">
-                <a16:creationId xmlns:a16="http://schemas.microsoft.com/office/drawing/2014/main" id="{85BE2633-7F2D-0A6C-0E74-9B6A55033767}"/>
+                <a16:creationId xmlns:a16="http://schemas.microsoft.com/office/drawing/2014/main" id="{5F2DB6C0-1148-9FCB-CDD9-ABDA5916A1DC}"/>
               </a:ext>
             </a:extLst>
           </p:cNvPr>
@@ -4615,10 +4625,10 @@
             <a:r>
               <a:rPr lang="en-US" dirty="0">
                 <a:solidFill>
-                  <a:srgbClr val="34A853"/>
+                  <a:srgbClr val="FFC107"/>
                 </a:solidFill>
               </a:rPr>
-              <a:t>DEPLOYMENT PHASE </a:t>
+              <a:t>DEVELOPMENT PHASE</a:t>
             </a:r>
           </a:p>
         </p:txBody>
@@ -4628,7 +4638,7 @@
           <p:cNvPr id="5" name="Slide Number Placeholder 4">
             <a:extLst>
               <a:ext uri="{FF2B5EF4-FFF2-40B4-BE49-F238E27FC236}">
-                <a16:creationId xmlns:a16="http://schemas.microsoft.com/office/drawing/2014/main" id="{E1599AC5-299B-B628-A5A1-530D794485A1}"/>
+                <a16:creationId xmlns:a16="http://schemas.microsoft.com/office/drawing/2014/main" id="{5094DE80-C79D-2479-C215-181BF7229889}"/>
               </a:ext>
             </a:extLst>
           </p:cNvPr>
@@ -4656,7 +4666,7 @@
     </p:spTree>
     <p:extLst>
       <p:ext uri="{BB962C8B-B14F-4D97-AF65-F5344CB8AC3E}">
-        <p14:creationId xmlns:p14="http://schemas.microsoft.com/office/powerpoint/2010/main" val="2724156979"/>
+        <p14:creationId xmlns:p14="http://schemas.microsoft.com/office/powerpoint/2010/main" val="1955825873"/>
       </p:ext>
     </p:extLst>
   </p:cSld>
@@ -4685,10 +4695,104 @@
       </p:grpSpPr>
       <p:sp>
         <p:nvSpPr>
-          <p:cNvPr id="4" name="Slide Number Placeholder 3">
-            <a:extLst>
-              <a:ext uri="{FF2B5EF4-FFF2-40B4-BE49-F238E27FC236}">
-                <a16:creationId xmlns:a16="http://schemas.microsoft.com/office/drawing/2014/main" id="{0B9B1223-5C57-969B-9425-26765DF1A97A}"/>
+          <p:cNvPr id="2" name="Title 1">
+            <a:extLst>
+              <a:ext uri="{FF2B5EF4-FFF2-40B4-BE49-F238E27FC236}">
+                <a16:creationId xmlns:a16="http://schemas.microsoft.com/office/drawing/2014/main" id="{45E6E326-373C-1AC4-C097-04883C94499F}"/>
+              </a:ext>
+            </a:extLst>
+          </p:cNvPr>
+          <p:cNvSpPr>
+            <a:spLocks noGrp="1"/>
+          </p:cNvSpPr>
+          <p:nvPr>
+            <p:ph type="title"/>
+          </p:nvPr>
+        </p:nvSpPr>
+        <p:spPr/>
+        <p:txBody>
+          <a:bodyPr/>
+          <a:lstStyle/>
+          <a:p>
+            <a:r>
+              <a:rPr lang="en-US" dirty="0"/>
+              <a:t>Shiny App Development</a:t>
+            </a:r>
+          </a:p>
+        </p:txBody>
+      </p:sp>
+      <p:sp>
+        <p:nvSpPr>
+          <p:cNvPr id="3" name="Content Placeholder 2">
+            <a:extLst>
+              <a:ext uri="{FF2B5EF4-FFF2-40B4-BE49-F238E27FC236}">
+                <a16:creationId xmlns:a16="http://schemas.microsoft.com/office/drawing/2014/main" id="{D90E4584-4AB6-7739-CF56-FED9201B5E53}"/>
+              </a:ext>
+            </a:extLst>
+          </p:cNvPr>
+          <p:cNvSpPr>
+            <a:spLocks noGrp="1"/>
+          </p:cNvSpPr>
+          <p:nvPr>
+            <p:ph idx="1"/>
+          </p:nvPr>
+        </p:nvSpPr>
+        <p:spPr/>
+        <p:txBody>
+          <a:bodyPr/>
+          <a:lstStyle/>
+          <a:p>
+            <a:r>
+              <a:rPr lang="en-US" dirty="0"/>
+              <a:t>Master of Shiny: Alex</a:t>
+            </a:r>
+          </a:p>
+          <a:p>
+            <a:r>
+              <a:rPr lang="en-US" dirty="0"/>
+              <a:t>Chad, Michelle, James</a:t>
+            </a:r>
+          </a:p>
+        </p:txBody>
+      </p:sp>
+      <p:sp>
+        <p:nvSpPr>
+          <p:cNvPr id="4" name="Text Placeholder 3">
+            <a:extLst>
+              <a:ext uri="{FF2B5EF4-FFF2-40B4-BE49-F238E27FC236}">
+                <a16:creationId xmlns:a16="http://schemas.microsoft.com/office/drawing/2014/main" id="{85BE2633-7F2D-0A6C-0E74-9B6A55033767}"/>
+              </a:ext>
+            </a:extLst>
+          </p:cNvPr>
+          <p:cNvSpPr>
+            <a:spLocks noGrp="1"/>
+          </p:cNvSpPr>
+          <p:nvPr>
+            <p:ph type="body" sz="quarter" idx="13"/>
+          </p:nvPr>
+        </p:nvSpPr>
+        <p:spPr/>
+        <p:txBody>
+          <a:bodyPr/>
+          <a:lstStyle/>
+          <a:p>
+            <a:r>
+              <a:rPr lang="en-US" dirty="0">
+                <a:solidFill>
+                  <a:srgbClr val="34A853"/>
+                </a:solidFill>
+              </a:rPr>
+              <a:t>DEPLOYMENT PHASE </a:t>
+            </a:r>
+          </a:p>
+        </p:txBody>
+      </p:sp>
+      <p:sp>
+        <p:nvSpPr>
+          <p:cNvPr id="5" name="Slide Number Placeholder 4">
+            <a:extLst>
+              <a:ext uri="{FF2B5EF4-FFF2-40B4-BE49-F238E27FC236}">
+                <a16:creationId xmlns:a16="http://schemas.microsoft.com/office/drawing/2014/main" id="{E1599AC5-299B-B628-A5A1-530D794485A1}"/>
               </a:ext>
             </a:extLst>
           </p:cNvPr>
@@ -4708,6 +4812,66 @@
               <a:rPr lang="en-US" smtClean="0"/>
               <a:pPr/>
               <a:t>13</a:t>
+            </a:fld>
+            <a:endParaRPr lang="en-US"/>
+          </a:p>
+        </p:txBody>
+      </p:sp>
+    </p:spTree>
+    <p:extLst>
+      <p:ext uri="{BB962C8B-B14F-4D97-AF65-F5344CB8AC3E}">
+        <p14:creationId xmlns:p14="http://schemas.microsoft.com/office/powerpoint/2010/main" val="2724156979"/>
+      </p:ext>
+    </p:extLst>
+  </p:cSld>
+  <p:clrMapOvr>
+    <a:masterClrMapping/>
+  </p:clrMapOvr>
+</p:sld>
+</file>
+
+<file path=ppt/slides/slide14.xml><?xml version="1.0" encoding="utf-8"?>
+<p:sld xmlns:a="http://schemas.openxmlformats.org/drawingml/2006/main" xmlns:r="http://schemas.openxmlformats.org/officeDocument/2006/relationships" xmlns:p="http://schemas.openxmlformats.org/presentationml/2006/main">
+  <p:cSld>
+    <p:spTree>
+      <p:nvGrpSpPr>
+        <p:cNvPr id="1" name=""/>
+        <p:cNvGrpSpPr/>
+        <p:nvPr/>
+      </p:nvGrpSpPr>
+      <p:grpSpPr>
+        <a:xfrm>
+          <a:off x="0" y="0"/>
+          <a:ext cx="0" cy="0"/>
+          <a:chOff x="0" y="0"/>
+          <a:chExt cx="0" cy="0"/>
+        </a:xfrm>
+      </p:grpSpPr>
+      <p:sp>
+        <p:nvSpPr>
+          <p:cNvPr id="4" name="Slide Number Placeholder 3">
+            <a:extLst>
+              <a:ext uri="{FF2B5EF4-FFF2-40B4-BE49-F238E27FC236}">
+                <a16:creationId xmlns:a16="http://schemas.microsoft.com/office/drawing/2014/main" id="{0B9B1223-5C57-969B-9425-26765DF1A97A}"/>
+              </a:ext>
+            </a:extLst>
+          </p:cNvPr>
+          <p:cNvSpPr>
+            <a:spLocks noGrp="1"/>
+          </p:cNvSpPr>
+          <p:nvPr>
+            <p:ph type="sldNum" sz="quarter" idx="12"/>
+          </p:nvPr>
+        </p:nvSpPr>
+        <p:spPr/>
+        <p:txBody>
+          <a:bodyPr/>
+          <a:lstStyle/>
+          <a:p>
+            <a:fld id="{16953E72-5372-4509-A2A3-ECFD8D3D7013}" type="slidenum">
+              <a:rPr lang="en-US" smtClean="0"/>
+              <a:pPr/>
+              <a:t>14</a:t>
             </a:fld>
             <a:endParaRPr lang="en-US"/>
           </a:p>
@@ -4830,7 +4994,10 @@
           <a:bodyPr/>
           <a:lstStyle/>
           <a:p>
-            <a:endParaRPr lang="en-US"/>
+            <a:r>
+              <a:rPr lang="en-US" dirty="0"/>
+              <a:t>Copy from somewhere</a:t>
+            </a:r>
           </a:p>
         </p:txBody>
       </p:sp>
@@ -6370,7 +6537,7 @@
                     <a:schemeClr val="tx1"/>
                   </a:solidFill>
                 </a:rPr>
-                <a:t>Feature Analysis</a:t>
+                <a:t>Feature Engineering</a:t>
               </a:r>
             </a:p>
           </p:txBody>
@@ -7262,7 +7429,7 @@
           <p:cNvPr id="2" name="Title 1">
             <a:extLst>
               <a:ext uri="{FF2B5EF4-FFF2-40B4-BE49-F238E27FC236}">
-                <a16:creationId xmlns:a16="http://schemas.microsoft.com/office/drawing/2014/main" id="{5BEC3ED8-36D9-98C9-9C5B-54F0CF78E64D}"/>
+                <a16:creationId xmlns:a16="http://schemas.microsoft.com/office/drawing/2014/main" id="{0EA51458-A11C-50DF-A601-722E5937634B}"/>
               </a:ext>
             </a:extLst>
           </p:cNvPr>
@@ -7278,33 +7445,36 @@
           <a:bodyPr/>
           <a:lstStyle/>
           <a:p>
+            <a:endParaRPr lang="en-US"/>
+          </a:p>
+        </p:txBody>
+      </p:sp>
+      <p:sp>
+        <p:nvSpPr>
+          <p:cNvPr id="3" name="Content Placeholder 2">
+            <a:extLst>
+              <a:ext uri="{FF2B5EF4-FFF2-40B4-BE49-F238E27FC236}">
+                <a16:creationId xmlns:a16="http://schemas.microsoft.com/office/drawing/2014/main" id="{6616F77B-2880-227A-45FE-F6DC5B67445B}"/>
+              </a:ext>
+            </a:extLst>
+          </p:cNvPr>
+          <p:cNvSpPr>
+            <a:spLocks noGrp="1"/>
+          </p:cNvSpPr>
+          <p:nvPr>
+            <p:ph idx="1"/>
+          </p:nvPr>
+        </p:nvSpPr>
+        <p:spPr/>
+        <p:txBody>
+          <a:bodyPr/>
+          <a:lstStyle/>
+          <a:p>
             <a:r>
               <a:rPr lang="en-US" dirty="0"/>
-              <a:t>Research Questions</a:t>
-            </a:r>
-          </a:p>
-        </p:txBody>
-      </p:sp>
-      <p:sp>
-        <p:nvSpPr>
-          <p:cNvPr id="3" name="Content Placeholder 2">
-            <a:extLst>
-              <a:ext uri="{FF2B5EF4-FFF2-40B4-BE49-F238E27FC236}">
-                <a16:creationId xmlns:a16="http://schemas.microsoft.com/office/drawing/2014/main" id="{DEF8E0DD-7CC3-A550-C732-44CD96DBF3C2}"/>
-              </a:ext>
-            </a:extLst>
-          </p:cNvPr>
-          <p:cNvSpPr>
-            <a:spLocks noGrp="1"/>
-          </p:cNvSpPr>
-          <p:nvPr>
-            <p:ph idx="1"/>
-          </p:nvPr>
-        </p:nvSpPr>
-        <p:spPr/>
-        <p:txBody>
-          <a:bodyPr/>
-          <a:lstStyle/>
+              <a:t>Market research? Zillow?</a:t>
+            </a:r>
+          </a:p>
           <a:p>
             <a:endParaRPr lang="en-US" dirty="0"/>
           </a:p>
@@ -7312,42 +7482,10 @@
       </p:sp>
       <p:sp>
         <p:nvSpPr>
-          <p:cNvPr id="4" name="Text Placeholder 3">
-            <a:extLst>
-              <a:ext uri="{FF2B5EF4-FFF2-40B4-BE49-F238E27FC236}">
-                <a16:creationId xmlns:a16="http://schemas.microsoft.com/office/drawing/2014/main" id="{00D76724-FA2E-2F76-3AD5-31221238AC22}"/>
-              </a:ext>
-            </a:extLst>
-          </p:cNvPr>
-          <p:cNvSpPr>
-            <a:spLocks noGrp="1"/>
-          </p:cNvSpPr>
-          <p:nvPr>
-            <p:ph type="body" sz="quarter" idx="13"/>
-          </p:nvPr>
-        </p:nvSpPr>
-        <p:spPr/>
-        <p:txBody>
-          <a:bodyPr/>
-          <a:lstStyle/>
-          <a:p>
-            <a:r>
-              <a:rPr lang="en-US" dirty="0">
-                <a:solidFill>
-                  <a:srgbClr val="4285F4"/>
-                </a:solidFill>
-              </a:rPr>
-              <a:t>DISCOVERY PHASE</a:t>
-            </a:r>
-          </a:p>
-        </p:txBody>
-      </p:sp>
-      <p:sp>
-        <p:nvSpPr>
-          <p:cNvPr id="5" name="Slide Number Placeholder 4">
-            <a:extLst>
-              <a:ext uri="{FF2B5EF4-FFF2-40B4-BE49-F238E27FC236}">
-                <a16:creationId xmlns:a16="http://schemas.microsoft.com/office/drawing/2014/main" id="{46BA8FE9-CF16-709D-62AD-1182E88FB186}"/>
+          <p:cNvPr id="4" name="Slide Number Placeholder 3">
+            <a:extLst>
+              <a:ext uri="{FF2B5EF4-FFF2-40B4-BE49-F238E27FC236}">
+                <a16:creationId xmlns:a16="http://schemas.microsoft.com/office/drawing/2014/main" id="{0C0E105D-E06E-1383-7F59-E3B2BA8C8124}"/>
               </a:ext>
             </a:extLst>
           </p:cNvPr>
@@ -7372,10 +7510,35 @@
           </a:p>
         </p:txBody>
       </p:sp>
+      <p:sp>
+        <p:nvSpPr>
+          <p:cNvPr id="5" name="Text Placeholder 4">
+            <a:extLst>
+              <a:ext uri="{FF2B5EF4-FFF2-40B4-BE49-F238E27FC236}">
+                <a16:creationId xmlns:a16="http://schemas.microsoft.com/office/drawing/2014/main" id="{533B7480-306B-9C03-5F86-1BE1E74BF0C3}"/>
+              </a:ext>
+            </a:extLst>
+          </p:cNvPr>
+          <p:cNvSpPr>
+            <a:spLocks noGrp="1"/>
+          </p:cNvSpPr>
+          <p:nvPr>
+            <p:ph type="body" sz="quarter" idx="13"/>
+          </p:nvPr>
+        </p:nvSpPr>
+        <p:spPr/>
+        <p:txBody>
+          <a:bodyPr/>
+          <a:lstStyle/>
+          <a:p>
+            <a:endParaRPr lang="en-US"/>
+          </a:p>
+        </p:txBody>
+      </p:sp>
     </p:spTree>
     <p:extLst>
       <p:ext uri="{BB962C8B-B14F-4D97-AF65-F5344CB8AC3E}">
-        <p14:creationId xmlns:p14="http://schemas.microsoft.com/office/powerpoint/2010/main" val="1115687083"/>
+        <p14:creationId xmlns:p14="http://schemas.microsoft.com/office/powerpoint/2010/main" val="2486999877"/>
       </p:ext>
     </p:extLst>
   </p:cSld>
@@ -7425,7 +7588,7 @@
           <a:p>
             <a:r>
               <a:rPr lang="en-US" dirty="0"/>
-              <a:t>Exploratory Data Analysis</a:t>
+              <a:t>Research Questions</a:t>
             </a:r>
           </a:p>
         </p:txBody>
@@ -7450,6 +7613,12 @@
         <p:txBody>
           <a:bodyPr/>
           <a:lstStyle/>
+          <a:p>
+            <a:r>
+              <a:rPr lang="en-US" dirty="0"/>
+              <a:t>Assess price point when you sell/buy</a:t>
+            </a:r>
+          </a:p>
           <a:p>
             <a:endParaRPr lang="en-US" dirty="0"/>
           </a:p>
@@ -7492,7 +7661,7 @@
           <p:cNvPr id="5" name="Slide Number Placeholder 4">
             <a:extLst>
               <a:ext uri="{FF2B5EF4-FFF2-40B4-BE49-F238E27FC236}">
-                <a16:creationId xmlns:a16="http://schemas.microsoft.com/office/drawing/2014/main" id="{BF1DF63C-7B31-FB24-63DD-680E1C59C505}"/>
+                <a16:creationId xmlns:a16="http://schemas.microsoft.com/office/drawing/2014/main" id="{46BA8FE9-CF16-709D-62AD-1182E88FB186}"/>
               </a:ext>
             </a:extLst>
           </p:cNvPr>
@@ -7520,7 +7689,7 @@
     </p:spTree>
     <p:extLst>
       <p:ext uri="{BB962C8B-B14F-4D97-AF65-F5344CB8AC3E}">
-        <p14:creationId xmlns:p14="http://schemas.microsoft.com/office/powerpoint/2010/main" val="3081230969"/>
+        <p14:creationId xmlns:p14="http://schemas.microsoft.com/office/powerpoint/2010/main" val="1115687083"/>
       </p:ext>
     </p:extLst>
   </p:cSld>
@@ -7552,7 +7721,7 @@
           <p:cNvPr id="2" name="Title 1">
             <a:extLst>
               <a:ext uri="{FF2B5EF4-FFF2-40B4-BE49-F238E27FC236}">
-                <a16:creationId xmlns:a16="http://schemas.microsoft.com/office/drawing/2014/main" id="{E883B92E-F86E-BFF4-1EC2-64FED28100DE}"/>
+                <a16:creationId xmlns:a16="http://schemas.microsoft.com/office/drawing/2014/main" id="{5BEC3ED8-36D9-98C9-9C5B-54F0CF78E64D}"/>
               </a:ext>
             </a:extLst>
           </p:cNvPr>
@@ -7570,7 +7739,7 @@
           <a:p>
             <a:r>
               <a:rPr lang="en-US" dirty="0"/>
-              <a:t>Feature Analysis</a:t>
+              <a:t>Exploratory Data Analysis</a:t>
             </a:r>
           </a:p>
         </p:txBody>
@@ -7580,7 +7749,7 @@
           <p:cNvPr id="3" name="Content Placeholder 2">
             <a:extLst>
               <a:ext uri="{FF2B5EF4-FFF2-40B4-BE49-F238E27FC236}">
-                <a16:creationId xmlns:a16="http://schemas.microsoft.com/office/drawing/2014/main" id="{D08DDFDF-46BE-AE3E-193C-71BF5488D21A}"/>
+                <a16:creationId xmlns:a16="http://schemas.microsoft.com/office/drawing/2014/main" id="{DEF8E0DD-7CC3-A550-C732-44CD96DBF3C2}"/>
               </a:ext>
             </a:extLst>
           </p:cNvPr>
@@ -7596,6 +7765,24 @@
           <a:bodyPr/>
           <a:lstStyle/>
           <a:p>
+            <a:r>
+              <a:rPr lang="en-US" dirty="0"/>
+              <a:t>Michelle: What EDA we did, what visuals we want to include</a:t>
+            </a:r>
+          </a:p>
+          <a:p>
+            <a:r>
+              <a:rPr lang="en-US" dirty="0"/>
+              <a:t>James: What EDA, feature selection</a:t>
+            </a:r>
+          </a:p>
+          <a:p>
+            <a:r>
+              <a:rPr lang="en-US" dirty="0"/>
+              <a:t>Chad: How I deleted some features</a:t>
+            </a:r>
+          </a:p>
+          <a:p>
             <a:endParaRPr lang="en-US" dirty="0"/>
           </a:p>
         </p:txBody>
@@ -7605,7 +7792,7 @@
           <p:cNvPr id="4" name="Text Placeholder 3">
             <a:extLst>
               <a:ext uri="{FF2B5EF4-FFF2-40B4-BE49-F238E27FC236}">
-                <a16:creationId xmlns:a16="http://schemas.microsoft.com/office/drawing/2014/main" id="{FAB7A6F0-A2A9-109D-2D09-1521A007FCAD}"/>
+                <a16:creationId xmlns:a16="http://schemas.microsoft.com/office/drawing/2014/main" id="{00D76724-FA2E-2F76-3AD5-31221238AC22}"/>
               </a:ext>
             </a:extLst>
           </p:cNvPr>
@@ -7624,12 +7811,11 @@
             <a:r>
               <a:rPr lang="en-US" dirty="0">
                 <a:solidFill>
-                  <a:srgbClr val="EF5350"/>
+                  <a:srgbClr val="4285F4"/>
                 </a:solidFill>
               </a:rPr>
-              <a:t>ANALYSIS PHASE</a:t>
-            </a:r>
-            <a:endParaRPr lang="en-US" dirty="0"/>
+              <a:t>DISCOVERY PHASE</a:t>
+            </a:r>
           </a:p>
         </p:txBody>
       </p:sp>
@@ -7638,7 +7824,7 @@
           <p:cNvPr id="5" name="Slide Number Placeholder 4">
             <a:extLst>
               <a:ext uri="{FF2B5EF4-FFF2-40B4-BE49-F238E27FC236}">
-                <a16:creationId xmlns:a16="http://schemas.microsoft.com/office/drawing/2014/main" id="{CE74F30F-1130-A3F8-F53D-E38A4676DED8}"/>
+                <a16:creationId xmlns:a16="http://schemas.microsoft.com/office/drawing/2014/main" id="{BF1DF63C-7B31-FB24-63DD-680E1C59C505}"/>
               </a:ext>
             </a:extLst>
           </p:cNvPr>
@@ -7666,7 +7852,7 @@
     </p:spTree>
     <p:extLst>
       <p:ext uri="{BB962C8B-B14F-4D97-AF65-F5344CB8AC3E}">
-        <p14:creationId xmlns:p14="http://schemas.microsoft.com/office/powerpoint/2010/main" val="1361637952"/>
+        <p14:creationId xmlns:p14="http://schemas.microsoft.com/office/powerpoint/2010/main" val="3081230969"/>
       </p:ext>
     </p:extLst>
   </p:cSld>
@@ -7698,7 +7884,7 @@
           <p:cNvPr id="2" name="Title 1">
             <a:extLst>
               <a:ext uri="{FF2B5EF4-FFF2-40B4-BE49-F238E27FC236}">
-                <a16:creationId xmlns:a16="http://schemas.microsoft.com/office/drawing/2014/main" id="{93CE7A6A-0F1F-DFAF-E4A1-A7DF3B9C496C}"/>
+                <a16:creationId xmlns:a16="http://schemas.microsoft.com/office/drawing/2014/main" id="{E883B92E-F86E-BFF4-1EC2-64FED28100DE}"/>
               </a:ext>
             </a:extLst>
           </p:cNvPr>
@@ -7716,7 +7902,7 @@
           <a:p>
             <a:r>
               <a:rPr lang="en-US" dirty="0"/>
-              <a:t>Data Cleaning</a:t>
+              <a:t>Feature Analysis</a:t>
             </a:r>
           </a:p>
         </p:txBody>
@@ -7726,7 +7912,7 @@
           <p:cNvPr id="3" name="Content Placeholder 2">
             <a:extLst>
               <a:ext uri="{FF2B5EF4-FFF2-40B4-BE49-F238E27FC236}">
-                <a16:creationId xmlns:a16="http://schemas.microsoft.com/office/drawing/2014/main" id="{77256492-72DD-75BB-0B95-65F19B06C669}"/>
+                <a16:creationId xmlns:a16="http://schemas.microsoft.com/office/drawing/2014/main" id="{D08DDFDF-46BE-AE3E-193C-71BF5488D21A}"/>
               </a:ext>
             </a:extLst>
           </p:cNvPr>
@@ -7742,7 +7928,10 @@
           <a:bodyPr/>
           <a:lstStyle/>
           <a:p>
-            <a:endParaRPr lang="en-US"/>
+            <a:r>
+              <a:rPr lang="en-US" dirty="0"/>
+              <a:t>Alex: Explanation of the features?</a:t>
+            </a:r>
           </a:p>
         </p:txBody>
       </p:sp>
@@ -7751,7 +7940,7 @@
           <p:cNvPr id="4" name="Text Placeholder 3">
             <a:extLst>
               <a:ext uri="{FF2B5EF4-FFF2-40B4-BE49-F238E27FC236}">
-                <a16:creationId xmlns:a16="http://schemas.microsoft.com/office/drawing/2014/main" id="{B8C67602-5344-E124-04C3-EC071221DD87}"/>
+                <a16:creationId xmlns:a16="http://schemas.microsoft.com/office/drawing/2014/main" id="{FAB7A6F0-A2A9-109D-2D09-1521A007FCAD}"/>
               </a:ext>
             </a:extLst>
           </p:cNvPr>
@@ -7784,7 +7973,7 @@
           <p:cNvPr id="5" name="Slide Number Placeholder 4">
             <a:extLst>
               <a:ext uri="{FF2B5EF4-FFF2-40B4-BE49-F238E27FC236}">
-                <a16:creationId xmlns:a16="http://schemas.microsoft.com/office/drawing/2014/main" id="{AF9EED9A-D6A4-B83B-5E8E-CEFFA228C1D1}"/>
+                <a16:creationId xmlns:a16="http://schemas.microsoft.com/office/drawing/2014/main" id="{CE74F30F-1130-A3F8-F53D-E38A4676DED8}"/>
               </a:ext>
             </a:extLst>
           </p:cNvPr>
@@ -7812,7 +8001,7 @@
     </p:spTree>
     <p:extLst>
       <p:ext uri="{BB962C8B-B14F-4D97-AF65-F5344CB8AC3E}">
-        <p14:creationId xmlns:p14="http://schemas.microsoft.com/office/powerpoint/2010/main" val="1356666315"/>
+        <p14:creationId xmlns:p14="http://schemas.microsoft.com/office/powerpoint/2010/main" val="1361637952"/>
       </p:ext>
     </p:extLst>
   </p:cSld>
@@ -7844,7 +8033,7 @@
           <p:cNvPr id="2" name="Title 1">
             <a:extLst>
               <a:ext uri="{FF2B5EF4-FFF2-40B4-BE49-F238E27FC236}">
-                <a16:creationId xmlns:a16="http://schemas.microsoft.com/office/drawing/2014/main" id="{6FBBFFCA-B1BE-F4E6-11B1-C0BE5996723F}"/>
+                <a16:creationId xmlns:a16="http://schemas.microsoft.com/office/drawing/2014/main" id="{93CE7A6A-0F1F-DFAF-E4A1-A7DF3B9C496C}"/>
               </a:ext>
             </a:extLst>
           </p:cNvPr>
@@ -7862,7 +8051,7 @@
           <a:p>
             <a:r>
               <a:rPr lang="en-US" dirty="0"/>
-              <a:t>Exploration of ML Algorithms</a:t>
+              <a:t>Data Cleaning</a:t>
             </a:r>
           </a:p>
         </p:txBody>
@@ -7872,7 +8061,7 @@
           <p:cNvPr id="3" name="Content Placeholder 2">
             <a:extLst>
               <a:ext uri="{FF2B5EF4-FFF2-40B4-BE49-F238E27FC236}">
-                <a16:creationId xmlns:a16="http://schemas.microsoft.com/office/drawing/2014/main" id="{0BFFE101-E76A-44FC-D06B-3046FC5FA28A}"/>
+                <a16:creationId xmlns:a16="http://schemas.microsoft.com/office/drawing/2014/main" id="{77256492-72DD-75BB-0B95-65F19B06C669}"/>
               </a:ext>
             </a:extLst>
           </p:cNvPr>
@@ -7888,6 +8077,12 @@
           <a:bodyPr/>
           <a:lstStyle/>
           <a:p>
+            <a:r>
+              <a:rPr lang="en-US" dirty="0"/>
+              <a:t>James, Chad: How we cleaned the data, How we deleted some outliers</a:t>
+            </a:r>
+          </a:p>
+          <a:p>
             <a:endParaRPr lang="en-US" dirty="0"/>
           </a:p>
         </p:txBody>
@@ -7897,7 +8092,7 @@
           <p:cNvPr id="4" name="Text Placeholder 3">
             <a:extLst>
               <a:ext uri="{FF2B5EF4-FFF2-40B4-BE49-F238E27FC236}">
-                <a16:creationId xmlns:a16="http://schemas.microsoft.com/office/drawing/2014/main" id="{9C9F4234-1733-D4D7-D242-32236358F60E}"/>
+                <a16:creationId xmlns:a16="http://schemas.microsoft.com/office/drawing/2014/main" id="{B8C67602-5344-E124-04C3-EC071221DD87}"/>
               </a:ext>
             </a:extLst>
           </p:cNvPr>
@@ -7921,6 +8116,7 @@
               </a:rPr>
               <a:t>ANALYSIS PHASE</a:t>
             </a:r>
+            <a:endParaRPr lang="en-US" dirty="0"/>
           </a:p>
         </p:txBody>
       </p:sp>
@@ -7929,7 +8125,7 @@
           <p:cNvPr id="5" name="Slide Number Placeholder 4">
             <a:extLst>
               <a:ext uri="{FF2B5EF4-FFF2-40B4-BE49-F238E27FC236}">
-                <a16:creationId xmlns:a16="http://schemas.microsoft.com/office/drawing/2014/main" id="{8A6B3CA8-31C3-C97C-4CE4-6DDD2FC2EE4D}"/>
+                <a16:creationId xmlns:a16="http://schemas.microsoft.com/office/drawing/2014/main" id="{AF9EED9A-D6A4-B83B-5E8E-CEFFA228C1D1}"/>
               </a:ext>
             </a:extLst>
           </p:cNvPr>
@@ -7957,7 +8153,7 @@
     </p:spTree>
     <p:extLst>
       <p:ext uri="{BB962C8B-B14F-4D97-AF65-F5344CB8AC3E}">
-        <p14:creationId xmlns:p14="http://schemas.microsoft.com/office/powerpoint/2010/main" val="4218745831"/>
+        <p14:creationId xmlns:p14="http://schemas.microsoft.com/office/powerpoint/2010/main" val="1356666315"/>
       </p:ext>
     </p:extLst>
   </p:cSld>
@@ -7989,7 +8185,7 @@
           <p:cNvPr id="2" name="Title 1">
             <a:extLst>
               <a:ext uri="{FF2B5EF4-FFF2-40B4-BE49-F238E27FC236}">
-                <a16:creationId xmlns:a16="http://schemas.microsoft.com/office/drawing/2014/main" id="{01D402C1-836E-3879-130F-2A6BE329EFED}"/>
+                <a16:creationId xmlns:a16="http://schemas.microsoft.com/office/drawing/2014/main" id="{6FBBFFCA-B1BE-F4E6-11B1-C0BE5996723F}"/>
               </a:ext>
             </a:extLst>
           </p:cNvPr>
@@ -8007,7 +8203,7 @@
           <a:p>
             <a:r>
               <a:rPr lang="en-US" dirty="0"/>
-              <a:t>Feature Engineering</a:t>
+              <a:t>Exploration of ML Algorithms</a:t>
             </a:r>
           </a:p>
         </p:txBody>
@@ -8017,7 +8213,7 @@
           <p:cNvPr id="3" name="Content Placeholder 2">
             <a:extLst>
               <a:ext uri="{FF2B5EF4-FFF2-40B4-BE49-F238E27FC236}">
-                <a16:creationId xmlns:a16="http://schemas.microsoft.com/office/drawing/2014/main" id="{F95B9AB7-EFF2-99F4-711E-7097D86B30CF}"/>
+                <a16:creationId xmlns:a16="http://schemas.microsoft.com/office/drawing/2014/main" id="{0BFFE101-E76A-44FC-D06B-3046FC5FA28A}"/>
               </a:ext>
             </a:extLst>
           </p:cNvPr>
@@ -8033,7 +8229,31 @@
           <a:bodyPr/>
           <a:lstStyle/>
           <a:p>
-            <a:endParaRPr lang="en-US"/>
+            <a:r>
+              <a:rPr lang="en-US" dirty="0"/>
+              <a:t>Michelle: Multiple regression, Tree? </a:t>
+            </a:r>
+          </a:p>
+          <a:p>
+            <a:endParaRPr lang="en-US" dirty="0"/>
+          </a:p>
+          <a:p>
+            <a:r>
+              <a:rPr lang="en-US" dirty="0" err="1"/>
+              <a:t>Gridsearch</a:t>
+            </a:r>
+            <a:r>
+              <a:rPr lang="en-US" dirty="0"/>
+              <a:t>? CV? Normalization? </a:t>
+            </a:r>
+            <a:r>
+              <a:rPr lang="en-US" dirty="0" err="1"/>
+              <a:t>Traintest</a:t>
+            </a:r>
+            <a:r>
+              <a:rPr lang="en-US" dirty="0"/>
+              <a:t> split?</a:t>
+            </a:r>
           </a:p>
         </p:txBody>
       </p:sp>
@@ -8042,7 +8262,7 @@
           <p:cNvPr id="4" name="Text Placeholder 3">
             <a:extLst>
               <a:ext uri="{FF2B5EF4-FFF2-40B4-BE49-F238E27FC236}">
-                <a16:creationId xmlns:a16="http://schemas.microsoft.com/office/drawing/2014/main" id="{5F2DB6C0-1148-9FCB-CDD9-ABDA5916A1DC}"/>
+                <a16:creationId xmlns:a16="http://schemas.microsoft.com/office/drawing/2014/main" id="{9C9F4234-1733-D4D7-D242-32236358F60E}"/>
               </a:ext>
             </a:extLst>
           </p:cNvPr>
@@ -8061,10 +8281,10 @@
             <a:r>
               <a:rPr lang="en-US" dirty="0">
                 <a:solidFill>
-                  <a:srgbClr val="FFC107"/>
+                  <a:srgbClr val="EF5350"/>
                 </a:solidFill>
               </a:rPr>
-              <a:t>DEVELOPMENT PHASE</a:t>
+              <a:t>ANALYSIS PHASE</a:t>
             </a:r>
           </a:p>
         </p:txBody>
@@ -8074,7 +8294,7 @@
           <p:cNvPr id="5" name="Slide Number Placeholder 4">
             <a:extLst>
               <a:ext uri="{FF2B5EF4-FFF2-40B4-BE49-F238E27FC236}">
-                <a16:creationId xmlns:a16="http://schemas.microsoft.com/office/drawing/2014/main" id="{9D4EB37D-7E69-70B4-9322-EE89C43D6997}"/>
+                <a16:creationId xmlns:a16="http://schemas.microsoft.com/office/drawing/2014/main" id="{8A6B3CA8-31C3-C97C-4CE4-6DDD2FC2EE4D}"/>
               </a:ext>
             </a:extLst>
           </p:cNvPr>
@@ -8102,7 +8322,7 @@
     </p:spTree>
     <p:extLst>
       <p:ext uri="{BB962C8B-B14F-4D97-AF65-F5344CB8AC3E}">
-        <p14:creationId xmlns:p14="http://schemas.microsoft.com/office/powerpoint/2010/main" val="3294741974"/>
+        <p14:creationId xmlns:p14="http://schemas.microsoft.com/office/powerpoint/2010/main" val="4218745831"/>
       </p:ext>
     </p:extLst>
   </p:cSld>

</xml_diff>